<commit_message>
add table with cols
</commit_message>
<xml_diff>
--- a/lib/pptx/templates/template.pptx
+++ b/lib/pptx/templates/template.pptx
@@ -65,10 +65,10 @@
         </a:solidFill>
         <a:effectLst/>
         <a:uFillTx/>
-        <a:latin typeface="Helvetica Neue Medium"/>
-        <a:ea typeface="Helvetica Neue Medium"/>
-        <a:cs typeface="Helvetica Neue Medium"/>
-        <a:sym typeface="Helvetica Neue Medium"/>
+        <a:latin typeface="+mj-lt"/>
+        <a:ea typeface="+mj-ea"/>
+        <a:cs typeface="+mj-cs"/>
+        <a:sym typeface="Helvetica"/>
       </a:defRPr>
     </a:lvl1pPr>
     <a:lvl2pPr marL="0" marR="0" indent="0" algn="ctr" defTabSz="825500" rtl="0" fontAlgn="auto" latinLnBrk="0" hangingPunct="0">
@@ -95,10 +95,10 @@
         </a:solidFill>
         <a:effectLst/>
         <a:uFillTx/>
-        <a:latin typeface="Helvetica Neue Medium"/>
-        <a:ea typeface="Helvetica Neue Medium"/>
-        <a:cs typeface="Helvetica Neue Medium"/>
-        <a:sym typeface="Helvetica Neue Medium"/>
+        <a:latin typeface="+mj-lt"/>
+        <a:ea typeface="+mj-ea"/>
+        <a:cs typeface="+mj-cs"/>
+        <a:sym typeface="Helvetica"/>
       </a:defRPr>
     </a:lvl2pPr>
     <a:lvl3pPr marL="0" marR="0" indent="0" algn="ctr" defTabSz="825500" rtl="0" fontAlgn="auto" latinLnBrk="0" hangingPunct="0">
@@ -125,10 +125,10 @@
         </a:solidFill>
         <a:effectLst/>
         <a:uFillTx/>
-        <a:latin typeface="Helvetica Neue Medium"/>
-        <a:ea typeface="Helvetica Neue Medium"/>
-        <a:cs typeface="Helvetica Neue Medium"/>
-        <a:sym typeface="Helvetica Neue Medium"/>
+        <a:latin typeface="+mj-lt"/>
+        <a:ea typeface="+mj-ea"/>
+        <a:cs typeface="+mj-cs"/>
+        <a:sym typeface="Helvetica"/>
       </a:defRPr>
     </a:lvl3pPr>
     <a:lvl4pPr marL="0" marR="0" indent="0" algn="ctr" defTabSz="825500" rtl="0" fontAlgn="auto" latinLnBrk="0" hangingPunct="0">
@@ -155,10 +155,10 @@
         </a:solidFill>
         <a:effectLst/>
         <a:uFillTx/>
-        <a:latin typeface="Helvetica Neue Medium"/>
-        <a:ea typeface="Helvetica Neue Medium"/>
-        <a:cs typeface="Helvetica Neue Medium"/>
-        <a:sym typeface="Helvetica Neue Medium"/>
+        <a:latin typeface="+mj-lt"/>
+        <a:ea typeface="+mj-ea"/>
+        <a:cs typeface="+mj-cs"/>
+        <a:sym typeface="Helvetica"/>
       </a:defRPr>
     </a:lvl4pPr>
     <a:lvl5pPr marL="0" marR="0" indent="0" algn="ctr" defTabSz="825500" rtl="0" fontAlgn="auto" latinLnBrk="0" hangingPunct="0">
@@ -185,10 +185,10 @@
         </a:solidFill>
         <a:effectLst/>
         <a:uFillTx/>
-        <a:latin typeface="Helvetica Neue Medium"/>
-        <a:ea typeface="Helvetica Neue Medium"/>
-        <a:cs typeface="Helvetica Neue Medium"/>
-        <a:sym typeface="Helvetica Neue Medium"/>
+        <a:latin typeface="+mj-lt"/>
+        <a:ea typeface="+mj-ea"/>
+        <a:cs typeface="+mj-cs"/>
+        <a:sym typeface="Helvetica"/>
       </a:defRPr>
     </a:lvl5pPr>
     <a:lvl6pPr marL="0" marR="0" indent="0" algn="ctr" defTabSz="825500" rtl="0" fontAlgn="auto" latinLnBrk="0" hangingPunct="0">
@@ -215,10 +215,10 @@
         </a:solidFill>
         <a:effectLst/>
         <a:uFillTx/>
-        <a:latin typeface="Helvetica Neue Medium"/>
-        <a:ea typeface="Helvetica Neue Medium"/>
-        <a:cs typeface="Helvetica Neue Medium"/>
-        <a:sym typeface="Helvetica Neue Medium"/>
+        <a:latin typeface="+mj-lt"/>
+        <a:ea typeface="+mj-ea"/>
+        <a:cs typeface="+mj-cs"/>
+        <a:sym typeface="Helvetica"/>
       </a:defRPr>
     </a:lvl6pPr>
     <a:lvl7pPr marL="0" marR="0" indent="0" algn="ctr" defTabSz="825500" rtl="0" fontAlgn="auto" latinLnBrk="0" hangingPunct="0">
@@ -245,10 +245,10 @@
         </a:solidFill>
         <a:effectLst/>
         <a:uFillTx/>
-        <a:latin typeface="Helvetica Neue Medium"/>
-        <a:ea typeface="Helvetica Neue Medium"/>
-        <a:cs typeface="Helvetica Neue Medium"/>
-        <a:sym typeface="Helvetica Neue Medium"/>
+        <a:latin typeface="+mj-lt"/>
+        <a:ea typeface="+mj-ea"/>
+        <a:cs typeface="+mj-cs"/>
+        <a:sym typeface="Helvetica"/>
       </a:defRPr>
     </a:lvl7pPr>
     <a:lvl8pPr marL="0" marR="0" indent="0" algn="ctr" defTabSz="825500" rtl="0" fontAlgn="auto" latinLnBrk="0" hangingPunct="0">
@@ -275,10 +275,10 @@
         </a:solidFill>
         <a:effectLst/>
         <a:uFillTx/>
-        <a:latin typeface="Helvetica Neue Medium"/>
-        <a:ea typeface="Helvetica Neue Medium"/>
-        <a:cs typeface="Helvetica Neue Medium"/>
-        <a:sym typeface="Helvetica Neue Medium"/>
+        <a:latin typeface="+mj-lt"/>
+        <a:ea typeface="+mj-ea"/>
+        <a:cs typeface="+mj-cs"/>
+        <a:sym typeface="Helvetica"/>
       </a:defRPr>
     </a:lvl8pPr>
     <a:lvl9pPr marL="0" marR="0" indent="0" algn="ctr" defTabSz="825500" rtl="0" fontAlgn="auto" latinLnBrk="0" hangingPunct="0">
@@ -305,10 +305,10 @@
         </a:solidFill>
         <a:effectLst/>
         <a:uFillTx/>
-        <a:latin typeface="Helvetica Neue Medium"/>
-        <a:ea typeface="Helvetica Neue Medium"/>
-        <a:cs typeface="Helvetica Neue Medium"/>
-        <a:sym typeface="Helvetica Neue Medium"/>
+        <a:latin typeface="+mj-lt"/>
+        <a:ea typeface="+mj-ea"/>
+        <a:cs typeface="+mj-cs"/>
+        <a:sym typeface="Helvetica"/>
       </a:defRPr>
     </a:lvl9pPr>
   </p:defaultTextStyle>
@@ -357,7 +357,7 @@
           <c:x val="0.326207"/>
           <c:y val="0"/>
           <c:w val="0.0955063"/>
-          <c:h val="0.140852"/>
+          <c:h val="0.142635"/>
         </c:manualLayout>
       </c:layout>
       <c:overlay val="1"/>
@@ -374,9 +374,9 @@
           <c:xMode val="edge"/>
           <c:yMode val="edge"/>
           <c:x val="0.0620269"/>
-          <c:y val="0.140852"/>
+          <c:y val="0.142635"/>
           <c:w val="0.656014"/>
-          <c:h val="0.766814"/>
+          <c:h val="0.764021"/>
         </c:manualLayout>
       </c:layout>
       <c:lineChart>
@@ -707,9 +707,9 @@
           <c:xMode val="edge"/>
           <c:yMode val="edge"/>
           <c:x val="0.74055"/>
-          <c:y val="0.459597"/>
+          <c:y val="0.459165"/>
           <c:w val="0.25945"/>
-          <c:h val="0.154326"/>
+          <c:h val="0.155963"/>
         </c:manualLayout>
       </c:layout>
       <c:overlay val="1"/>
@@ -828,9 +828,9 @@
         <a:spcPct val="117999"/>
       </a:lnSpc>
       <a:defRPr sz="2200">
-        <a:latin typeface="+mj-lt"/>
-        <a:ea typeface="+mj-ea"/>
-        <a:cs typeface="+mj-cs"/>
+        <a:latin typeface="+mn-lt"/>
+        <a:ea typeface="+mn-ea"/>
+        <a:cs typeface="+mn-cs"/>
         <a:sym typeface="Helvetica Neue"/>
       </a:defRPr>
     </a:lvl1pPr>
@@ -839,9 +839,9 @@
         <a:spcPct val="117999"/>
       </a:lnSpc>
       <a:defRPr sz="2200">
-        <a:latin typeface="+mj-lt"/>
-        <a:ea typeface="+mj-ea"/>
-        <a:cs typeface="+mj-cs"/>
+        <a:latin typeface="+mn-lt"/>
+        <a:ea typeface="+mn-ea"/>
+        <a:cs typeface="+mn-cs"/>
         <a:sym typeface="Helvetica Neue"/>
       </a:defRPr>
     </a:lvl2pPr>
@@ -850,9 +850,9 @@
         <a:spcPct val="117999"/>
       </a:lnSpc>
       <a:defRPr sz="2200">
-        <a:latin typeface="+mj-lt"/>
-        <a:ea typeface="+mj-ea"/>
-        <a:cs typeface="+mj-cs"/>
+        <a:latin typeface="+mn-lt"/>
+        <a:ea typeface="+mn-ea"/>
+        <a:cs typeface="+mn-cs"/>
         <a:sym typeface="Helvetica Neue"/>
       </a:defRPr>
     </a:lvl3pPr>
@@ -861,9 +861,9 @@
         <a:spcPct val="117999"/>
       </a:lnSpc>
       <a:defRPr sz="2200">
-        <a:latin typeface="+mj-lt"/>
-        <a:ea typeface="+mj-ea"/>
-        <a:cs typeface="+mj-cs"/>
+        <a:latin typeface="+mn-lt"/>
+        <a:ea typeface="+mn-ea"/>
+        <a:cs typeface="+mn-cs"/>
         <a:sym typeface="Helvetica Neue"/>
       </a:defRPr>
     </a:lvl4pPr>
@@ -872,9 +872,9 @@
         <a:spcPct val="117999"/>
       </a:lnSpc>
       <a:defRPr sz="2200">
-        <a:latin typeface="+mj-lt"/>
-        <a:ea typeface="+mj-ea"/>
-        <a:cs typeface="+mj-cs"/>
+        <a:latin typeface="+mn-lt"/>
+        <a:ea typeface="+mn-ea"/>
+        <a:cs typeface="+mn-cs"/>
         <a:sym typeface="Helvetica Neue"/>
       </a:defRPr>
     </a:lvl5pPr>
@@ -883,9 +883,9 @@
         <a:spcPct val="117999"/>
       </a:lnSpc>
       <a:defRPr sz="2200">
-        <a:latin typeface="+mj-lt"/>
-        <a:ea typeface="+mj-ea"/>
-        <a:cs typeface="+mj-cs"/>
+        <a:latin typeface="+mn-lt"/>
+        <a:ea typeface="+mn-ea"/>
+        <a:cs typeface="+mn-cs"/>
         <a:sym typeface="Helvetica Neue"/>
       </a:defRPr>
     </a:lvl6pPr>
@@ -894,9 +894,9 @@
         <a:spcPct val="117999"/>
       </a:lnSpc>
       <a:defRPr sz="2200">
-        <a:latin typeface="+mj-lt"/>
-        <a:ea typeface="+mj-ea"/>
-        <a:cs typeface="+mj-cs"/>
+        <a:latin typeface="+mn-lt"/>
+        <a:ea typeface="+mn-ea"/>
+        <a:cs typeface="+mn-cs"/>
         <a:sym typeface="Helvetica Neue"/>
       </a:defRPr>
     </a:lvl7pPr>
@@ -905,9 +905,9 @@
         <a:spcPct val="117999"/>
       </a:lnSpc>
       <a:defRPr sz="2200">
-        <a:latin typeface="+mj-lt"/>
-        <a:ea typeface="+mj-ea"/>
-        <a:cs typeface="+mj-cs"/>
+        <a:latin typeface="+mn-lt"/>
+        <a:ea typeface="+mn-ea"/>
+        <a:cs typeface="+mn-cs"/>
         <a:sym typeface="Helvetica Neue"/>
       </a:defRPr>
     </a:lvl8pPr>
@@ -916,9 +916,9 @@
         <a:spcPct val="117999"/>
       </a:lnSpc>
       <a:defRPr sz="2200">
-        <a:latin typeface="+mj-lt"/>
-        <a:ea typeface="+mj-ea"/>
-        <a:cs typeface="+mj-cs"/>
+        <a:latin typeface="+mn-lt"/>
+        <a:ea typeface="+mn-ea"/>
+        <a:cs typeface="+mn-cs"/>
         <a:sym typeface="Helvetica Neue"/>
       </a:defRPr>
     </a:lvl9pPr>
@@ -1140,25 +1140,25 @@
               <a:buNone/>
               <a:defRPr i="1" sz="3200"/>
             </a:lvl1pPr>
-            <a:lvl2pPr marL="1025769" indent="-390769" algn="ctr">
+            <a:lvl2pPr marL="1025768" indent="-390768" algn="ctr">
               <a:spcBef>
                 <a:spcPts val="0"/>
               </a:spcBef>
               <a:defRPr i="1" sz="3200"/>
             </a:lvl2pPr>
-            <a:lvl3pPr marL="1660769" indent="-390769" algn="ctr">
+            <a:lvl3pPr marL="1660768" indent="-390768" algn="ctr">
               <a:spcBef>
                 <a:spcPts val="0"/>
               </a:spcBef>
               <a:defRPr i="1" sz="3200"/>
             </a:lvl3pPr>
-            <a:lvl4pPr marL="2295769" indent="-390769" algn="ctr">
+            <a:lvl4pPr marL="2295768" indent="-390768" algn="ctr">
               <a:spcBef>
                 <a:spcPts val="0"/>
               </a:spcBef>
               <a:defRPr i="1" sz="3200"/>
             </a:lvl4pPr>
-            <a:lvl5pPr marL="2930769" indent="-390769" algn="ctr">
+            <a:lvl5pPr marL="2930768" indent="-390768" algn="ctr">
               <a:spcBef>
                 <a:spcPts val="0"/>
               </a:spcBef>
@@ -1218,19 +1218,7 @@
           <a:bodyPr/>
           <a:lstStyle/>
           <a:p>
-            <a:pPr marL="0" indent="0" algn="ctr">
-              <a:spcBef>
-                <a:spcPts val="0"/>
-              </a:spcBef>
-              <a:buSzTx/>
-              <a:buNone/>
-              <a:defRPr>
-                <a:latin typeface="Helvetica Neue Medium"/>
-                <a:ea typeface="Helvetica Neue Medium"/>
-                <a:cs typeface="Helvetica Neue Medium"/>
-                <a:sym typeface="Helvetica Neue Medium"/>
-              </a:defRPr>
-            </a:pPr>
+            <a:pPr/>
           </a:p>
         </p:txBody>
       </p:sp>
@@ -1415,8 +1403,8 @@
         </p:nvSpPr>
         <p:spPr>
           <a:xfrm>
-            <a:off x="3125967" y="-393700"/>
-            <a:ext cx="18135603" cy="12090400"/>
+            <a:off x="3125966" y="-393700"/>
+            <a:ext cx="18135605" cy="12090400"/>
           </a:xfrm>
           <a:prstGeom prst="rect">
             <a:avLst/>
@@ -2903,9 +2891,9 @@
             <a:srgbClr val="000000"/>
           </a:solidFill>
           <a:uFillTx/>
-          <a:latin typeface="+mj-lt"/>
-          <a:ea typeface="+mj-ea"/>
-          <a:cs typeface="+mj-cs"/>
+          <a:latin typeface="+mn-lt"/>
+          <a:ea typeface="+mn-ea"/>
+          <a:cs typeface="+mn-cs"/>
           <a:sym typeface="Helvetica Neue"/>
         </a:defRPr>
       </a:lvl1pPr>
@@ -2929,9 +2917,9 @@
             <a:srgbClr val="000000"/>
           </a:solidFill>
           <a:uFillTx/>
-          <a:latin typeface="+mj-lt"/>
-          <a:ea typeface="+mj-ea"/>
-          <a:cs typeface="+mj-cs"/>
+          <a:latin typeface="+mn-lt"/>
+          <a:ea typeface="+mn-ea"/>
+          <a:cs typeface="+mn-cs"/>
           <a:sym typeface="Helvetica Neue"/>
         </a:defRPr>
       </a:lvl2pPr>
@@ -2955,9 +2943,9 @@
             <a:srgbClr val="000000"/>
           </a:solidFill>
           <a:uFillTx/>
-          <a:latin typeface="+mj-lt"/>
-          <a:ea typeface="+mj-ea"/>
-          <a:cs typeface="+mj-cs"/>
+          <a:latin typeface="+mn-lt"/>
+          <a:ea typeface="+mn-ea"/>
+          <a:cs typeface="+mn-cs"/>
           <a:sym typeface="Helvetica Neue"/>
         </a:defRPr>
       </a:lvl3pPr>
@@ -2981,9 +2969,9 @@
             <a:srgbClr val="000000"/>
           </a:solidFill>
           <a:uFillTx/>
-          <a:latin typeface="+mj-lt"/>
-          <a:ea typeface="+mj-ea"/>
-          <a:cs typeface="+mj-cs"/>
+          <a:latin typeface="+mn-lt"/>
+          <a:ea typeface="+mn-ea"/>
+          <a:cs typeface="+mn-cs"/>
           <a:sym typeface="Helvetica Neue"/>
         </a:defRPr>
       </a:lvl4pPr>
@@ -3007,13 +2995,13 @@
             <a:srgbClr val="000000"/>
           </a:solidFill>
           <a:uFillTx/>
-          <a:latin typeface="+mj-lt"/>
-          <a:ea typeface="+mj-ea"/>
-          <a:cs typeface="+mj-cs"/>
+          <a:latin typeface="+mn-lt"/>
+          <a:ea typeface="+mn-ea"/>
+          <a:cs typeface="+mn-cs"/>
           <a:sym typeface="Helvetica Neue"/>
         </a:defRPr>
       </a:lvl5pPr>
-      <a:lvl6pPr marL="3761153" marR="0" indent="-586153" algn="l" defTabSz="825500" rtl="0" latinLnBrk="0">
+      <a:lvl6pPr marL="3761152" marR="0" indent="-586152" algn="l" defTabSz="825500" rtl="0" latinLnBrk="0">
         <a:lnSpc>
           <a:spcPct val="100000"/>
         </a:lnSpc>
@@ -3033,13 +3021,13 @@
             <a:srgbClr val="000000"/>
           </a:solidFill>
           <a:uFillTx/>
-          <a:latin typeface="+mj-lt"/>
-          <a:ea typeface="+mj-ea"/>
-          <a:cs typeface="+mj-cs"/>
+          <a:latin typeface="+mn-lt"/>
+          <a:ea typeface="+mn-ea"/>
+          <a:cs typeface="+mn-cs"/>
           <a:sym typeface="Helvetica Neue"/>
         </a:defRPr>
       </a:lvl6pPr>
-      <a:lvl7pPr marL="4396153" marR="0" indent="-586153" algn="l" defTabSz="825500" rtl="0" latinLnBrk="0">
+      <a:lvl7pPr marL="4396152" marR="0" indent="-586152" algn="l" defTabSz="825500" rtl="0" latinLnBrk="0">
         <a:lnSpc>
           <a:spcPct val="100000"/>
         </a:lnSpc>
@@ -3059,13 +3047,13 @@
             <a:srgbClr val="000000"/>
           </a:solidFill>
           <a:uFillTx/>
-          <a:latin typeface="+mj-lt"/>
-          <a:ea typeface="+mj-ea"/>
-          <a:cs typeface="+mj-cs"/>
+          <a:latin typeface="+mn-lt"/>
+          <a:ea typeface="+mn-ea"/>
+          <a:cs typeface="+mn-cs"/>
           <a:sym typeface="Helvetica Neue"/>
         </a:defRPr>
       </a:lvl7pPr>
-      <a:lvl8pPr marL="5031153" marR="0" indent="-586153" algn="l" defTabSz="825500" rtl="0" latinLnBrk="0">
+      <a:lvl8pPr marL="5031152" marR="0" indent="-586152" algn="l" defTabSz="825500" rtl="0" latinLnBrk="0">
         <a:lnSpc>
           <a:spcPct val="100000"/>
         </a:lnSpc>
@@ -3085,13 +3073,13 @@
             <a:srgbClr val="000000"/>
           </a:solidFill>
           <a:uFillTx/>
-          <a:latin typeface="+mj-lt"/>
-          <a:ea typeface="+mj-ea"/>
-          <a:cs typeface="+mj-cs"/>
+          <a:latin typeface="+mn-lt"/>
+          <a:ea typeface="+mn-ea"/>
+          <a:cs typeface="+mn-cs"/>
           <a:sym typeface="Helvetica Neue"/>
         </a:defRPr>
       </a:lvl8pPr>
-      <a:lvl9pPr marL="5666153" marR="0" indent="-586153" algn="l" defTabSz="825500" rtl="0" latinLnBrk="0">
+      <a:lvl9pPr marL="5666152" marR="0" indent="-586152" algn="l" defTabSz="825500" rtl="0" latinLnBrk="0">
         <a:lnSpc>
           <a:spcPct val="100000"/>
         </a:lnSpc>
@@ -3111,9 +3099,9 @@
             <a:srgbClr val="000000"/>
           </a:solidFill>
           <a:uFillTx/>
-          <a:latin typeface="+mj-lt"/>
-          <a:ea typeface="+mj-ea"/>
-          <a:cs typeface="+mj-cs"/>
+          <a:latin typeface="+mn-lt"/>
+          <a:ea typeface="+mn-ea"/>
+          <a:cs typeface="+mn-cs"/>
           <a:sym typeface="Helvetica Neue"/>
         </a:defRPr>
       </a:lvl9pPr>
@@ -3384,6 +3372,10 @@
           </p:nvPr>
         </p:nvSpPr>
         <p:spPr>
+          <a:xfrm>
+            <a:off x="4300180" y="3686186"/>
+            <a:ext cx="15936009" cy="2201308"/>
+          </a:xfrm>
           <a:prstGeom prst="rect">
             <a:avLst/>
           </a:prstGeom>
@@ -3408,6 +3400,10 @@
           </p:nvPr>
         </p:nvSpPr>
         <p:spPr>
+          <a:xfrm>
+            <a:off x="3798637" y="7744857"/>
+            <a:ext cx="16786726" cy="1183623"/>
+          </a:xfrm>
           <a:prstGeom prst="rect">
             <a:avLst/>
           </a:prstGeom>
@@ -3620,7 +3616,7 @@
                       </a:pPr>
                       <a:r>
                         <a:rPr sz="3200">
-                          <a:sym typeface="Helvetica Neue Medium"/>
+                          <a:sym typeface="Helvetica"/>
                         </a:rPr>
                         <a:t>1</a:t>
                       </a:r>
@@ -3638,7 +3634,7 @@
                       </a:pPr>
                       <a:r>
                         <a:rPr sz="3200">
-                          <a:sym typeface="Helvetica Neue Medium"/>
+                          <a:sym typeface="Helvetica"/>
                         </a:rPr>
                         <a:t>2</a:t>
                       </a:r>
@@ -3656,7 +3652,7 @@
                       </a:pPr>
                       <a:r>
                         <a:rPr sz="3200">
-                          <a:sym typeface="Helvetica Neue Medium"/>
+                          <a:sym typeface="Helvetica"/>
                         </a:rPr>
                         <a:t>3</a:t>
                       </a:r>
@@ -3674,7 +3670,7 @@
                       </a:pPr>
                       <a:r>
                         <a:rPr sz="3200">
-                          <a:sym typeface="Helvetica Neue Medium"/>
+                          <a:sym typeface="Helvetica"/>
                         </a:rPr>
                         <a:t>4</a:t>
                       </a:r>
@@ -3694,7 +3690,7 @@
                       </a:pPr>
                       <a:r>
                         <a:rPr sz="3200">
-                          <a:sym typeface="Helvetica Neue Medium"/>
+                          <a:sym typeface="Helvetica"/>
                         </a:rPr>
                         <a:t>5</a:t>
                       </a:r>
@@ -3712,7 +3708,7 @@
                       </a:pPr>
                       <a:r>
                         <a:rPr sz="3200">
-                          <a:sym typeface="Helvetica Neue Medium"/>
+                          <a:sym typeface="Helvetica"/>
                         </a:rPr>
                         <a:t>6</a:t>
                       </a:r>
@@ -3730,7 +3726,7 @@
                       </a:pPr>
                       <a:r>
                         <a:rPr sz="3200">
-                          <a:sym typeface="Helvetica Neue Medium"/>
+                          <a:sym typeface="Helvetica"/>
                         </a:rPr>
                         <a:t>7</a:t>
                       </a:r>
@@ -3748,7 +3744,7 @@
                       </a:pPr>
                       <a:r>
                         <a:rPr sz="3200">
-                          <a:sym typeface="Helvetica Neue Medium"/>
+                          <a:sym typeface="Helvetica"/>
                         </a:rPr>
                         <a:t>8</a:t>
                       </a:r>
@@ -3765,7 +3761,7 @@
                     <a:p>
                       <a:pPr defTabSz="914400">
                         <a:defRPr sz="3200">
-                          <a:sym typeface="Helvetica Neue Medium"/>
+                          <a:sym typeface="Helvetica"/>
                         </a:defRPr>
                       </a:pPr>
                     </a:p>
@@ -3779,7 +3775,7 @@
                     <a:p>
                       <a:pPr defTabSz="914400">
                         <a:defRPr sz="3200">
-                          <a:sym typeface="Helvetica Neue Medium"/>
+                          <a:sym typeface="Helvetica"/>
                         </a:defRPr>
                       </a:pPr>
                     </a:p>
@@ -3793,7 +3789,7 @@
                     <a:p>
                       <a:pPr defTabSz="914400">
                         <a:defRPr sz="3200">
-                          <a:sym typeface="Helvetica Neue Medium"/>
+                          <a:sym typeface="Helvetica"/>
                         </a:defRPr>
                       </a:pPr>
                     </a:p>
@@ -3807,7 +3803,7 @@
                     <a:p>
                       <a:pPr defTabSz="914400">
                         <a:defRPr sz="3200">
-                          <a:sym typeface="Helvetica Neue Medium"/>
+                          <a:sym typeface="Helvetica"/>
                         </a:defRPr>
                       </a:pPr>
                     </a:p>
@@ -3823,7 +3819,7 @@
                     <a:p>
                       <a:pPr defTabSz="914400">
                         <a:defRPr sz="3200">
-                          <a:sym typeface="Helvetica Neue Medium"/>
+                          <a:sym typeface="Helvetica"/>
                         </a:defRPr>
                       </a:pPr>
                     </a:p>
@@ -3837,7 +3833,7 @@
                     <a:p>
                       <a:pPr defTabSz="914400">
                         <a:defRPr sz="3200">
-                          <a:sym typeface="Helvetica Neue Medium"/>
+                          <a:sym typeface="Helvetica"/>
                         </a:defRPr>
                       </a:pPr>
                     </a:p>
@@ -3851,7 +3847,7 @@
                     <a:p>
                       <a:pPr defTabSz="914400">
                         <a:defRPr sz="3200">
-                          <a:sym typeface="Helvetica Neue Medium"/>
+                          <a:sym typeface="Helvetica"/>
                         </a:defRPr>
                       </a:pPr>
                     </a:p>
@@ -3865,7 +3861,7 @@
                     <a:p>
                       <a:pPr defTabSz="914400">
                         <a:defRPr sz="3200">
-                          <a:sym typeface="Helvetica Neue Medium"/>
+                          <a:sym typeface="Helvetica"/>
                         </a:defRPr>
                       </a:pPr>
                     </a:p>
@@ -3934,8 +3930,8 @@
           <p:nvPr/>
         </p:nvGraphicFramePr>
         <p:xfrm>
-          <a:off x="7655457" y="3676642"/>
-          <a:ext cx="12433208" cy="8629187"/>
+          <a:off x="7655456" y="3676638"/>
+          <a:ext cx="12433213" cy="8521322"/>
         </p:xfrm>
         <a:graphic xmlns:a="http://schemas.openxmlformats.org/drawingml/2006/main">
           <a:graphicData uri="http://schemas.openxmlformats.org/drawingml/2006/chart">
@@ -3995,14 +3991,14 @@
     </a:clrScheme>
     <a:fontScheme name="White">
       <a:majorFont>
+        <a:latin typeface="Helvetica"/>
+        <a:ea typeface="Helvetica"/>
+        <a:cs typeface="Helvetica"/>
+      </a:majorFont>
+      <a:minorFont>
         <a:latin typeface="Helvetica Neue"/>
         <a:ea typeface="Helvetica Neue"/>
         <a:cs typeface="Helvetica Neue"/>
-      </a:majorFont>
-      <a:minorFont>
-        <a:latin typeface="Helvetica"/>
-        <a:ea typeface="Helvetica"/>
-        <a:cs typeface="Helvetica"/>
       </a:minorFont>
     </a:fontScheme>
     <a:fmtScheme name="White">
@@ -4183,10 +4179,10 @@
             </a:solidFill>
             <a:effectLst/>
             <a:uFillTx/>
-            <a:latin typeface="Helvetica Neue Medium"/>
-            <a:ea typeface="Helvetica Neue Medium"/>
-            <a:cs typeface="Helvetica Neue Medium"/>
-            <a:sym typeface="Helvetica Neue Medium"/>
+            <a:latin typeface="+mj-lt"/>
+            <a:ea typeface="+mj-ea"/>
+            <a:cs typeface="+mj-cs"/>
+            <a:sym typeface="Helvetica"/>
           </a:defRPr>
         </a:defPPr>
         <a:lvl1pPr marL="0" marR="0" indent="0" algn="l" defTabSz="914400" rtl="0" fontAlgn="auto" latinLnBrk="1" hangingPunct="0">
@@ -4754,10 +4750,10 @@
             </a:solidFill>
             <a:effectLst/>
             <a:uFillTx/>
-            <a:latin typeface="Helvetica Neue Medium"/>
-            <a:ea typeface="Helvetica Neue Medium"/>
-            <a:cs typeface="Helvetica Neue Medium"/>
-            <a:sym typeface="Helvetica Neue Medium"/>
+            <a:latin typeface="+mj-lt"/>
+            <a:ea typeface="+mj-ea"/>
+            <a:cs typeface="+mj-cs"/>
+            <a:sym typeface="Helvetica"/>
           </a:defRPr>
         </a:defPPr>
         <a:lvl1pPr marL="0" marR="0" indent="0" algn="l" defTabSz="914400" rtl="0" fontAlgn="auto" latinLnBrk="1" hangingPunct="0">
@@ -5049,14 +5045,14 @@
     </a:clrScheme>
     <a:fontScheme name="White">
       <a:majorFont>
+        <a:latin typeface="Helvetica"/>
+        <a:ea typeface="Helvetica"/>
+        <a:cs typeface="Helvetica"/>
+      </a:majorFont>
+      <a:minorFont>
         <a:latin typeface="Helvetica Neue"/>
         <a:ea typeface="Helvetica Neue"/>
         <a:cs typeface="Helvetica Neue"/>
-      </a:majorFont>
-      <a:minorFont>
-        <a:latin typeface="Helvetica"/>
-        <a:ea typeface="Helvetica"/>
-        <a:cs typeface="Helvetica"/>
       </a:minorFont>
     </a:fontScheme>
     <a:fmtScheme name="White">
@@ -5237,10 +5233,10 @@
             </a:solidFill>
             <a:effectLst/>
             <a:uFillTx/>
-            <a:latin typeface="Helvetica Neue Medium"/>
-            <a:ea typeface="Helvetica Neue Medium"/>
-            <a:cs typeface="Helvetica Neue Medium"/>
-            <a:sym typeface="Helvetica Neue Medium"/>
+            <a:latin typeface="+mj-lt"/>
+            <a:ea typeface="+mj-ea"/>
+            <a:cs typeface="+mj-cs"/>
+            <a:sym typeface="Helvetica"/>
           </a:defRPr>
         </a:defPPr>
         <a:lvl1pPr marL="0" marR="0" indent="0" algn="l" defTabSz="914400" rtl="0" fontAlgn="auto" latinLnBrk="1" hangingPunct="0">
@@ -5808,10 +5804,10 @@
             </a:solidFill>
             <a:effectLst/>
             <a:uFillTx/>
-            <a:latin typeface="Helvetica Neue Medium"/>
-            <a:ea typeface="Helvetica Neue Medium"/>
-            <a:cs typeface="Helvetica Neue Medium"/>
-            <a:sym typeface="Helvetica Neue Medium"/>
+            <a:latin typeface="+mj-lt"/>
+            <a:ea typeface="+mj-ea"/>
+            <a:cs typeface="+mj-cs"/>
+            <a:sym typeface="Helvetica"/>
           </a:defRPr>
         </a:defPPr>
         <a:lvl1pPr marL="0" marR="0" indent="0" algn="l" defTabSz="914400" rtl="0" fontAlgn="auto" latinLnBrk="1" hangingPunct="0">

</xml_diff>

<commit_message>
add bar support in pptx
</commit_message>
<xml_diff>
--- a/lib/pptx/templates/template.pptx
+++ b/lib/pptx/templates/template.pptx
@@ -11,6 +11,7 @@
     <p:sldId id="256" r:id="rId8"/>
     <p:sldId id="257" r:id="rId9"/>
     <p:sldId id="258" r:id="rId10"/>
+    <p:sldId id="259" r:id="rId11"/>
   </p:sldIdLst>
   <p:sldSz cx="24384000" cy="13716000"/>
   <p:notesSz cx="6858000" cy="9144000"/>
@@ -65,10 +66,10 @@
         </a:solidFill>
         <a:effectLst/>
         <a:uFillTx/>
-        <a:latin typeface="+mj-lt"/>
-        <a:ea typeface="+mj-ea"/>
-        <a:cs typeface="+mj-cs"/>
-        <a:sym typeface="Helvetica"/>
+        <a:latin typeface="+mn-lt"/>
+        <a:ea typeface="+mn-ea"/>
+        <a:cs typeface="+mn-cs"/>
+        <a:sym typeface="Helvetica Neue"/>
       </a:defRPr>
     </a:lvl1pPr>
     <a:lvl2pPr marL="0" marR="0" indent="0" algn="ctr" defTabSz="825500" rtl="0" fontAlgn="auto" latinLnBrk="0" hangingPunct="0">
@@ -95,10 +96,10 @@
         </a:solidFill>
         <a:effectLst/>
         <a:uFillTx/>
-        <a:latin typeface="+mj-lt"/>
-        <a:ea typeface="+mj-ea"/>
-        <a:cs typeface="+mj-cs"/>
-        <a:sym typeface="Helvetica"/>
+        <a:latin typeface="+mn-lt"/>
+        <a:ea typeface="+mn-ea"/>
+        <a:cs typeface="+mn-cs"/>
+        <a:sym typeface="Helvetica Neue"/>
       </a:defRPr>
     </a:lvl2pPr>
     <a:lvl3pPr marL="0" marR="0" indent="0" algn="ctr" defTabSz="825500" rtl="0" fontAlgn="auto" latinLnBrk="0" hangingPunct="0">
@@ -125,10 +126,10 @@
         </a:solidFill>
         <a:effectLst/>
         <a:uFillTx/>
-        <a:latin typeface="+mj-lt"/>
-        <a:ea typeface="+mj-ea"/>
-        <a:cs typeface="+mj-cs"/>
-        <a:sym typeface="Helvetica"/>
+        <a:latin typeface="+mn-lt"/>
+        <a:ea typeface="+mn-ea"/>
+        <a:cs typeface="+mn-cs"/>
+        <a:sym typeface="Helvetica Neue"/>
       </a:defRPr>
     </a:lvl3pPr>
     <a:lvl4pPr marL="0" marR="0" indent="0" algn="ctr" defTabSz="825500" rtl="0" fontAlgn="auto" latinLnBrk="0" hangingPunct="0">
@@ -155,10 +156,10 @@
         </a:solidFill>
         <a:effectLst/>
         <a:uFillTx/>
-        <a:latin typeface="+mj-lt"/>
-        <a:ea typeface="+mj-ea"/>
-        <a:cs typeface="+mj-cs"/>
-        <a:sym typeface="Helvetica"/>
+        <a:latin typeface="+mn-lt"/>
+        <a:ea typeface="+mn-ea"/>
+        <a:cs typeface="+mn-cs"/>
+        <a:sym typeface="Helvetica Neue"/>
       </a:defRPr>
     </a:lvl4pPr>
     <a:lvl5pPr marL="0" marR="0" indent="0" algn="ctr" defTabSz="825500" rtl="0" fontAlgn="auto" latinLnBrk="0" hangingPunct="0">
@@ -185,10 +186,10 @@
         </a:solidFill>
         <a:effectLst/>
         <a:uFillTx/>
-        <a:latin typeface="+mj-lt"/>
-        <a:ea typeface="+mj-ea"/>
-        <a:cs typeface="+mj-cs"/>
-        <a:sym typeface="Helvetica"/>
+        <a:latin typeface="+mn-lt"/>
+        <a:ea typeface="+mn-ea"/>
+        <a:cs typeface="+mn-cs"/>
+        <a:sym typeface="Helvetica Neue"/>
       </a:defRPr>
     </a:lvl5pPr>
     <a:lvl6pPr marL="0" marR="0" indent="0" algn="ctr" defTabSz="825500" rtl="0" fontAlgn="auto" latinLnBrk="0" hangingPunct="0">
@@ -215,10 +216,10 @@
         </a:solidFill>
         <a:effectLst/>
         <a:uFillTx/>
-        <a:latin typeface="+mj-lt"/>
-        <a:ea typeface="+mj-ea"/>
-        <a:cs typeface="+mj-cs"/>
-        <a:sym typeface="Helvetica"/>
+        <a:latin typeface="+mn-lt"/>
+        <a:ea typeface="+mn-ea"/>
+        <a:cs typeface="+mn-cs"/>
+        <a:sym typeface="Helvetica Neue"/>
       </a:defRPr>
     </a:lvl6pPr>
     <a:lvl7pPr marL="0" marR="0" indent="0" algn="ctr" defTabSz="825500" rtl="0" fontAlgn="auto" latinLnBrk="0" hangingPunct="0">
@@ -245,10 +246,10 @@
         </a:solidFill>
         <a:effectLst/>
         <a:uFillTx/>
-        <a:latin typeface="+mj-lt"/>
-        <a:ea typeface="+mj-ea"/>
-        <a:cs typeface="+mj-cs"/>
-        <a:sym typeface="Helvetica"/>
+        <a:latin typeface="+mn-lt"/>
+        <a:ea typeface="+mn-ea"/>
+        <a:cs typeface="+mn-cs"/>
+        <a:sym typeface="Helvetica Neue"/>
       </a:defRPr>
     </a:lvl7pPr>
     <a:lvl8pPr marL="0" marR="0" indent="0" algn="ctr" defTabSz="825500" rtl="0" fontAlgn="auto" latinLnBrk="0" hangingPunct="0">
@@ -275,10 +276,10 @@
         </a:solidFill>
         <a:effectLst/>
         <a:uFillTx/>
-        <a:latin typeface="+mj-lt"/>
-        <a:ea typeface="+mj-ea"/>
-        <a:cs typeface="+mj-cs"/>
-        <a:sym typeface="Helvetica"/>
+        <a:latin typeface="+mn-lt"/>
+        <a:ea typeface="+mn-ea"/>
+        <a:cs typeface="+mn-cs"/>
+        <a:sym typeface="Helvetica Neue"/>
       </a:defRPr>
     </a:lvl8pPr>
     <a:lvl9pPr marL="0" marR="0" indent="0" algn="ctr" defTabSz="825500" rtl="0" fontAlgn="auto" latinLnBrk="0" hangingPunct="0">
@@ -305,10 +306,10 @@
         </a:solidFill>
         <a:effectLst/>
         <a:uFillTx/>
-        <a:latin typeface="+mj-lt"/>
-        <a:ea typeface="+mj-ea"/>
-        <a:cs typeface="+mj-cs"/>
-        <a:sym typeface="Helvetica"/>
+        <a:latin typeface="+mn-lt"/>
+        <a:ea typeface="+mn-ea"/>
+        <a:cs typeface="+mn-cs"/>
+        <a:sym typeface="Helvetica Neue"/>
       </a:defRPr>
     </a:lvl9pPr>
   </p:defaultTextStyle>
@@ -357,7 +358,7 @@
           <c:x val="0.326207"/>
           <c:y val="0"/>
           <c:w val="0.0955063"/>
-          <c:h val="0.142635"/>
+          <c:h val="0.144441"/>
         </c:manualLayout>
       </c:layout>
       <c:overlay val="1"/>
@@ -374,9 +375,9 @@
           <c:xMode val="edge"/>
           <c:yMode val="edge"/>
           <c:x val="0.0620269"/>
-          <c:y val="0.142635"/>
+          <c:y val="0.144441"/>
           <c:w val="0.656014"/>
-          <c:h val="0.764021"/>
+          <c:h val="0.761192"/>
         </c:manualLayout>
       </c:layout>
       <c:lineChart>
@@ -707,9 +708,418 @@
           <c:xMode val="edge"/>
           <c:yMode val="edge"/>
           <c:x val="0.74055"/>
-          <c:y val="0.459165"/>
+          <c:y val="0.458727"/>
           <c:w val="0.25945"/>
-          <c:h val="0.155963"/>
+          <c:h val="0.15762"/>
+        </c:manualLayout>
+      </c:layout>
+      <c:overlay val="1"/>
+      <c:spPr>
+        <a:noFill/>
+        <a:ln w="12700" cap="flat">
+          <a:noFill/>
+          <a:miter lim="400000"/>
+        </a:ln>
+        <a:effectLst/>
+      </c:spPr>
+      <c:txPr>
+        <a:bodyPr rot="0"/>
+        <a:lstStyle/>
+        <a:p>
+          <a:pPr>
+            <a:defRPr b="0" i="0" strike="noStrike" sz="3800" u="none">
+              <a:solidFill>
+                <a:srgbClr val="000000"/>
+              </a:solidFill>
+              <a:latin typeface="Helvetica Neue"/>
+            </a:defRPr>
+          </a:pPr>
+        </a:p>
+      </c:txPr>
+    </c:legend>
+    <c:plotVisOnly val="1"/>
+    <c:dispBlanksAs val="gap"/>
+  </c:chart>
+  <c:spPr>
+    <a:noFill/>
+    <a:ln>
+      <a:noFill/>
+    </a:ln>
+    <a:effectLst/>
+  </c:spPr>
+  <c:externalData r:id="rId1">
+    <c:autoUpdate val="0"/>
+  </c:externalData>
+</c:chartSpace>
+</file>
+
+<file path=ppt/charts/chart2.xml><?xml version="1.0" encoding="utf-8"?>
+<c:chartSpace xmlns:c="http://schemas.openxmlformats.org/drawingml/2006/chart" xmlns:a="http://schemas.openxmlformats.org/drawingml/2006/main" xmlns:r="http://schemas.openxmlformats.org/officeDocument/2006/relationships">
+  <c:date1904 val="1"/>
+  <c:roundedCorners val="0"/>
+  <c:chart>
+    <c:title>
+      <c:tx>
+        <c:rich>
+          <a:bodyPr rot="0"/>
+          <a:lstStyle/>
+          <a:p>
+            <a:pPr>
+              <a:defRPr b="0" i="0" strike="noStrike" sz="5000" u="none">
+                <a:solidFill>
+                  <a:srgbClr val="000000"/>
+                </a:solidFill>
+                <a:latin typeface="Helvetica Neue"/>
+              </a:defRPr>
+            </a:pPr>
+            <a:r>
+              <a:rPr b="0" i="0" strike="noStrike" sz="5000" u="none">
+                <a:solidFill>
+                  <a:srgbClr val="000000"/>
+                </a:solidFill>
+                <a:latin typeface="Helvetica Neue"/>
+              </a:rPr>
+              <a:t>Title</a:t>
+            </a:r>
+          </a:p>
+        </c:rich>
+      </c:tx>
+      <c:layout>
+        <c:manualLayout>
+          <c:xMode val="edge"/>
+          <c:yMode val="edge"/>
+          <c:x val="0.311267"/>
+          <c:y val="0"/>
+          <c:w val="0.0955063"/>
+          <c:h val="0.144441"/>
+        </c:manualLayout>
+      </c:layout>
+      <c:overlay val="1"/>
+      <c:spPr>
+        <a:noFill/>
+        <a:effectLst/>
+      </c:spPr>
+    </c:title>
+    <c:autoTitleDeleted val="1"/>
+    <c:plotArea>
+      <c:layout>
+        <c:manualLayout>
+          <c:layoutTarget val="inner"/>
+          <c:xMode val="edge"/>
+          <c:yMode val="edge"/>
+          <c:x val="0.0620269"/>
+          <c:y val="0.144441"/>
+          <c:w val="0.656014"/>
+          <c:h val="0.761192"/>
+        </c:manualLayout>
+      </c:layout>
+      <c:barChart>
+        <c:barDir val="col"/>
+        <c:grouping val="clustered"/>
+        <c:varyColors val="0"/>
+        <c:ser>
+          <c:idx val="0"/>
+          <c:order val="0"/>
+          <c:tx>
+            <c:strRef>
+              <c:f>Sheet1!$A$2</c:f>
+              <c:strCache>
+                <c:ptCount val="1"/>
+                <c:pt idx="0">
+                  <c:v>Region 1</c:v>
+                </c:pt>
+              </c:strCache>
+            </c:strRef>
+          </c:tx>
+          <c:spPr>
+            <a:solidFill>
+              <a:srgbClr val="56C1FF"/>
+            </a:solidFill>
+            <a:ln w="76200" cap="flat">
+              <a:solidFill>
+                <a:srgbClr val="56C1FF"/>
+              </a:solidFill>
+              <a:prstDash val="solid"/>
+              <a:miter lim="400000"/>
+            </a:ln>
+            <a:effectLst/>
+          </c:spPr>
+          <c:invertIfNegative val="0"/>
+          <c:dLbls>
+            <c:numFmt formatCode="#,##0" sourceLinked="0"/>
+            <c:txPr>
+              <a:bodyPr/>
+              <a:lstStyle/>
+              <a:p>
+                <a:pPr>
+                  <a:defRPr b="0" i="0" strike="noStrike" sz="1800" u="none">
+                    <a:solidFill>
+                      <a:srgbClr val="000000"/>
+                    </a:solidFill>
+                    <a:latin typeface="Helvetica Neue"/>
+                  </a:defRPr>
+                </a:pPr>
+              </a:p>
+            </c:txPr>
+            <c:dLblPos val="outEnd"/>
+            <c:showLegendKey val="0"/>
+            <c:showVal val="0"/>
+            <c:showCatName val="0"/>
+            <c:showSerName val="0"/>
+            <c:showPercent val="0"/>
+            <c:showBubbleSize val="0"/>
+            <c:showLeaderLines val="0"/>
+          </c:dLbls>
+          <c:cat>
+            <c:strRef>
+              <c:f>Sheet1!$B$1:$E$1</c:f>
+              <c:strCache>
+                <c:ptCount val="4"/>
+                <c:pt idx="0">
+                  <c:v>April</c:v>
+                </c:pt>
+                <c:pt idx="1">
+                  <c:v>May</c:v>
+                </c:pt>
+                <c:pt idx="2">
+                  <c:v>June</c:v>
+                </c:pt>
+                <c:pt idx="3">
+                  <c:v>July</c:v>
+                </c:pt>
+              </c:strCache>
+            </c:strRef>
+          </c:cat>
+          <c:val>
+            <c:numRef>
+              <c:f>Sheet1!$B$2:$E$2</c:f>
+              <c:numCache>
+                <c:ptCount val="4"/>
+                <c:pt idx="0">
+                  <c:v>1.000000</c:v>
+                </c:pt>
+                <c:pt idx="1">
+                  <c:v>2.000000</c:v>
+                </c:pt>
+                <c:pt idx="2">
+                  <c:v>3.000000</c:v>
+                </c:pt>
+                <c:pt idx="3">
+                  <c:v>4.000000</c:v>
+                </c:pt>
+              </c:numCache>
+            </c:numRef>
+          </c:val>
+        </c:ser>
+        <c:ser>
+          <c:idx val="1"/>
+          <c:order val="1"/>
+          <c:tx>
+            <c:strRef>
+              <c:f>Sheet1!$A$3</c:f>
+              <c:strCache>
+                <c:ptCount val="1"/>
+                <c:pt idx="0">
+                  <c:v>Region 2</c:v>
+                </c:pt>
+              </c:strCache>
+            </c:strRef>
+          </c:tx>
+          <c:spPr>
+            <a:solidFill>
+              <a:schemeClr val="accent1"/>
+            </a:solidFill>
+            <a:ln w="76200" cap="flat">
+              <a:solidFill>
+                <a:schemeClr val="accent1"/>
+              </a:solidFill>
+              <a:prstDash val="solid"/>
+              <a:miter lim="400000"/>
+            </a:ln>
+            <a:effectLst/>
+          </c:spPr>
+          <c:invertIfNegative val="0"/>
+          <c:dLbls>
+            <c:numFmt formatCode="#,##0" sourceLinked="0"/>
+            <c:txPr>
+              <a:bodyPr/>
+              <a:lstStyle/>
+              <a:p>
+                <a:pPr>
+                  <a:defRPr b="0" i="0" strike="noStrike" sz="1800" u="none">
+                    <a:solidFill>
+                      <a:srgbClr val="000000"/>
+                    </a:solidFill>
+                    <a:latin typeface="Helvetica Neue"/>
+                  </a:defRPr>
+                </a:pPr>
+              </a:p>
+            </c:txPr>
+            <c:dLblPos val="outEnd"/>
+            <c:showLegendKey val="0"/>
+            <c:showVal val="0"/>
+            <c:showCatName val="0"/>
+            <c:showSerName val="0"/>
+            <c:showPercent val="0"/>
+            <c:showBubbleSize val="0"/>
+            <c:showLeaderLines val="0"/>
+          </c:dLbls>
+          <c:cat>
+            <c:strRef>
+              <c:f>Sheet1!$B$1:$E$1</c:f>
+              <c:strCache>
+                <c:ptCount val="4"/>
+                <c:pt idx="0">
+                  <c:v>April</c:v>
+                </c:pt>
+                <c:pt idx="1">
+                  <c:v>May</c:v>
+                </c:pt>
+                <c:pt idx="2">
+                  <c:v>June</c:v>
+                </c:pt>
+                <c:pt idx="3">
+                  <c:v>July</c:v>
+                </c:pt>
+              </c:strCache>
+            </c:strRef>
+          </c:cat>
+          <c:val>
+            <c:numRef>
+              <c:f>Sheet1!$B$3:$E$3</c:f>
+              <c:numCache>
+                <c:ptCount val="4"/>
+                <c:pt idx="0">
+                  <c:v>55.000000</c:v>
+                </c:pt>
+                <c:pt idx="1">
+                  <c:v>43.000000</c:v>
+                </c:pt>
+                <c:pt idx="2">
+                  <c:v>70.000000</c:v>
+                </c:pt>
+                <c:pt idx="3">
+                  <c:v>58.000000</c:v>
+                </c:pt>
+              </c:numCache>
+            </c:numRef>
+          </c:val>
+        </c:ser>
+        <c:gapWidth val="150"/>
+        <c:overlap val="0"/>
+        <c:axId val="2094734552"/>
+        <c:axId val="2094734553"/>
+      </c:barChart>
+      <c:catAx>
+        <c:axId val="2094734552"/>
+        <c:scaling>
+          <c:orientation val="minMax"/>
+        </c:scaling>
+        <c:delete val="0"/>
+        <c:axPos val="b"/>
+        <c:numFmt formatCode="General" sourceLinked="0"/>
+        <c:majorTickMark val="none"/>
+        <c:minorTickMark val="none"/>
+        <c:tickLblPos val="low"/>
+        <c:spPr>
+          <a:ln w="12700" cap="flat">
+            <a:solidFill>
+              <a:srgbClr val="000000"/>
+            </a:solidFill>
+            <a:prstDash val="solid"/>
+            <a:miter lim="400000"/>
+          </a:ln>
+        </c:spPr>
+        <c:txPr>
+          <a:bodyPr rot="0"/>
+          <a:lstStyle/>
+          <a:p>
+            <a:pPr>
+              <a:defRPr b="0" i="0" strike="noStrike" sz="3200" u="none">
+                <a:solidFill>
+                  <a:srgbClr val="000000"/>
+                </a:solidFill>
+                <a:latin typeface="Helvetica Neue"/>
+              </a:defRPr>
+            </a:pPr>
+          </a:p>
+        </c:txPr>
+        <c:crossAx val="2094734553"/>
+        <c:crosses val="autoZero"/>
+        <c:auto val="1"/>
+        <c:lblAlgn val="ctr"/>
+        <c:noMultiLvlLbl val="1"/>
+      </c:catAx>
+      <c:valAx>
+        <c:axId val="2094734553"/>
+        <c:scaling>
+          <c:orientation val="minMax"/>
+        </c:scaling>
+        <c:delete val="0"/>
+        <c:axPos val="l"/>
+        <c:majorGridlines>
+          <c:spPr>
+            <a:ln w="12700" cap="flat">
+              <a:solidFill>
+                <a:srgbClr val="B8B8B8"/>
+              </a:solidFill>
+              <a:prstDash val="solid"/>
+              <a:miter lim="400000"/>
+            </a:ln>
+          </c:spPr>
+        </c:majorGridlines>
+        <c:numFmt formatCode="0" sourceLinked="0"/>
+        <c:majorTickMark val="none"/>
+        <c:minorTickMark val="none"/>
+        <c:tickLblPos val="nextTo"/>
+        <c:spPr>
+          <a:ln w="12700" cap="flat">
+            <a:solidFill>
+              <a:srgbClr val="000000"/>
+            </a:solidFill>
+            <a:prstDash val="solid"/>
+            <a:miter lim="400000"/>
+          </a:ln>
+        </c:spPr>
+        <c:txPr>
+          <a:bodyPr rot="0"/>
+          <a:lstStyle/>
+          <a:p>
+            <a:pPr>
+              <a:defRPr b="0" i="0" strike="noStrike" sz="3200" u="none">
+                <a:solidFill>
+                  <a:srgbClr val="000000"/>
+                </a:solidFill>
+                <a:latin typeface="Helvetica Neue"/>
+              </a:defRPr>
+            </a:pPr>
+          </a:p>
+        </c:txPr>
+        <c:crossAx val="2094734552"/>
+        <c:crosses val="autoZero"/>
+        <c:crossBetween val="between"/>
+        <c:majorUnit val="17.5"/>
+        <c:minorUnit val="8.75"/>
+      </c:valAx>
+      <c:spPr>
+        <a:noFill/>
+        <a:ln w="12700" cap="flat">
+          <a:noFill/>
+          <a:miter lim="400000"/>
+        </a:ln>
+        <a:effectLst/>
+      </c:spPr>
+    </c:plotArea>
+    <c:legend>
+      <c:legendPos val="r"/>
+      <c:layout>
+        <c:manualLayout>
+          <c:xMode val="edge"/>
+          <c:yMode val="edge"/>
+          <c:x val="0.74055"/>
+          <c:y val="0.458727"/>
+          <c:w val="0.25945"/>
+          <c:h val="0.15762"/>
         </c:manualLayout>
       </c:layout>
       <c:overlay val="1"/>
@@ -1403,8 +1813,8 @@
         </p:nvSpPr>
         <p:spPr>
           <a:xfrm>
-            <a:off x="3125966" y="-393700"/>
-            <a:ext cx="18135605" cy="12090400"/>
+            <a:off x="3125965" y="-393700"/>
+            <a:ext cx="18135606" cy="12090400"/>
           </a:xfrm>
           <a:prstGeom prst="rect">
             <a:avLst/>
@@ -3001,7 +3411,7 @@
           <a:sym typeface="Helvetica Neue"/>
         </a:defRPr>
       </a:lvl5pPr>
-      <a:lvl6pPr marL="3761152" marR="0" indent="-586152" algn="l" defTabSz="825500" rtl="0" latinLnBrk="0">
+      <a:lvl6pPr marL="3761151" marR="0" indent="-586152" algn="l" defTabSz="825500" rtl="0" latinLnBrk="0">
         <a:lnSpc>
           <a:spcPct val="100000"/>
         </a:lnSpc>
@@ -3027,7 +3437,7 @@
           <a:sym typeface="Helvetica Neue"/>
         </a:defRPr>
       </a:lvl6pPr>
-      <a:lvl7pPr marL="4396152" marR="0" indent="-586152" algn="l" defTabSz="825500" rtl="0" latinLnBrk="0">
+      <a:lvl7pPr marL="4396151" marR="0" indent="-586151" algn="l" defTabSz="825500" rtl="0" latinLnBrk="0">
         <a:lnSpc>
           <a:spcPct val="100000"/>
         </a:lnSpc>
@@ -3053,7 +3463,7 @@
           <a:sym typeface="Helvetica Neue"/>
         </a:defRPr>
       </a:lvl7pPr>
-      <a:lvl8pPr marL="5031152" marR="0" indent="-586152" algn="l" defTabSz="825500" rtl="0" latinLnBrk="0">
+      <a:lvl8pPr marL="5031151" marR="0" indent="-586151" algn="l" defTabSz="825500" rtl="0" latinLnBrk="0">
         <a:lnSpc>
           <a:spcPct val="100000"/>
         </a:lnSpc>
@@ -3079,7 +3489,7 @@
           <a:sym typeface="Helvetica Neue"/>
         </a:defRPr>
       </a:lvl8pPr>
-      <a:lvl9pPr marL="5666152" marR="0" indent="-586152" algn="l" defTabSz="825500" rtl="0" latinLnBrk="0">
+      <a:lvl9pPr marL="5666151" marR="0" indent="-586151" algn="l" defTabSz="825500" rtl="0" latinLnBrk="0">
         <a:lnSpc>
           <a:spcPct val="100000"/>
         </a:lnSpc>
@@ -3373,8 +3783,8 @@
         </p:nvSpPr>
         <p:spPr>
           <a:xfrm>
-            <a:off x="4300180" y="3686186"/>
-            <a:ext cx="15936009" cy="2201308"/>
+            <a:off x="4300180" y="3686185"/>
+            <a:ext cx="15936009" cy="2201309"/>
           </a:xfrm>
           <a:prstGeom prst="rect">
             <a:avLst/>
@@ -3401,8 +3811,8 @@
         </p:nvSpPr>
         <p:spPr>
           <a:xfrm>
-            <a:off x="3798637" y="7744857"/>
-            <a:ext cx="16786726" cy="1183623"/>
+            <a:off x="3798637" y="7744856"/>
+            <a:ext cx="16786726" cy="1183624"/>
           </a:xfrm>
           <a:prstGeom prst="rect">
             <a:avLst/>
@@ -3930,8 +4340,74 @@
           <p:nvPr/>
         </p:nvGraphicFramePr>
         <p:xfrm>
-          <a:off x="7655456" y="3676638"/>
-          <a:ext cx="12433213" cy="8521322"/>
+          <a:off x="7655455" y="3676635"/>
+          <a:ext cx="12433217" cy="8414808"/>
+        </p:xfrm>
+        <a:graphic xmlns:a="http://schemas.openxmlformats.org/drawingml/2006/main">
+          <a:graphicData uri="http://schemas.openxmlformats.org/drawingml/2006/chart">
+            <c:chart xmlns:c="http://schemas.openxmlformats.org/drawingml/2006/chart" r:id="rId2"/>
+          </a:graphicData>
+        </a:graphic>
+      </p:graphicFrame>
+    </p:spTree>
+  </p:cSld>
+  <p:clrMapOvr>
+    <a:masterClrMapping/>
+  </p:clrMapOvr>
+  <p:transition xmlns:p14="http://schemas.microsoft.com/office/powerpoint/2010/main" spd="med" advClick="1"/>
+</p:sld>
+</file>
+
+<file path=ppt/slides/slide4.xml><?xml version="1.0" encoding="utf-8"?>
+<p:sld xmlns:a="http://schemas.openxmlformats.org/drawingml/2006/main" xmlns:r="http://schemas.openxmlformats.org/officeDocument/2006/relationships" xmlns:p="http://schemas.openxmlformats.org/presentationml/2006/main" xmlns:m="http://schemas.openxmlformats.org/officeDocument/2006/math" xmlns:a14="http://schemas.microsoft.com/office/drawing/2010/main" showMasterSp="1" showMasterPhAnim="1">
+  <p:cSld>
+    <p:spTree>
+      <p:nvGrpSpPr>
+        <p:cNvPr id="1" name=""/>
+        <p:cNvGrpSpPr/>
+        <p:nvPr/>
+      </p:nvGrpSpPr>
+      <p:grpSpPr>
+        <a:xfrm>
+          <a:off x="0" y="0"/>
+          <a:ext cx="0" cy="0"/>
+          <a:chOff x="0" y="0"/>
+          <a:chExt cx="0" cy="0"/>
+        </a:xfrm>
+      </p:grpSpPr>
+      <p:sp>
+        <p:nvSpPr>
+          <p:cNvPr id="128" name="Bar Chart"/>
+          <p:cNvSpPr txBox="1"/>
+          <p:nvPr>
+            <p:ph type="title"/>
+          </p:nvPr>
+        </p:nvSpPr>
+        <p:spPr>
+          <a:prstGeom prst="rect">
+            <a:avLst/>
+          </a:prstGeom>
+        </p:spPr>
+        <p:txBody>
+          <a:bodyPr/>
+          <a:lstStyle/>
+          <a:p>
+            <a:pPr/>
+            <a:r>
+              <a:t>Bar Chart</a:t>
+            </a:r>
+          </a:p>
+        </p:txBody>
+      </p:sp>
+      <p:graphicFrame>
+        <p:nvGraphicFramePr>
+          <p:cNvPr id="129" name="Title"/>
+          <p:cNvGraphicFramePr/>
+          <p:nvPr/>
+        </p:nvGraphicFramePr>
+        <p:xfrm>
+          <a:off x="7728221" y="3341157"/>
+          <a:ext cx="12433218" cy="8414808"/>
         </p:xfrm>
         <a:graphic xmlns:a="http://schemas.openxmlformats.org/drawingml/2006/main">
           <a:graphicData uri="http://schemas.openxmlformats.org/drawingml/2006/chart">
@@ -4179,10 +4655,10 @@
             </a:solidFill>
             <a:effectLst/>
             <a:uFillTx/>
-            <a:latin typeface="+mj-lt"/>
-            <a:ea typeface="+mj-ea"/>
-            <a:cs typeface="+mj-cs"/>
-            <a:sym typeface="Helvetica"/>
+            <a:latin typeface="+mn-lt"/>
+            <a:ea typeface="+mn-ea"/>
+            <a:cs typeface="+mn-cs"/>
+            <a:sym typeface="Helvetica Neue"/>
           </a:defRPr>
         </a:defPPr>
         <a:lvl1pPr marL="0" marR="0" indent="0" algn="l" defTabSz="914400" rtl="0" fontAlgn="auto" latinLnBrk="1" hangingPunct="0">
@@ -4750,10 +5226,10 @@
             </a:solidFill>
             <a:effectLst/>
             <a:uFillTx/>
-            <a:latin typeface="+mj-lt"/>
-            <a:ea typeface="+mj-ea"/>
-            <a:cs typeface="+mj-cs"/>
-            <a:sym typeface="Helvetica"/>
+            <a:latin typeface="+mn-lt"/>
+            <a:ea typeface="+mn-ea"/>
+            <a:cs typeface="+mn-cs"/>
+            <a:sym typeface="Helvetica Neue"/>
           </a:defRPr>
         </a:defPPr>
         <a:lvl1pPr marL="0" marR="0" indent="0" algn="l" defTabSz="914400" rtl="0" fontAlgn="auto" latinLnBrk="1" hangingPunct="0">
@@ -5233,10 +5709,10 @@
             </a:solidFill>
             <a:effectLst/>
             <a:uFillTx/>
-            <a:latin typeface="+mj-lt"/>
-            <a:ea typeface="+mj-ea"/>
-            <a:cs typeface="+mj-cs"/>
-            <a:sym typeface="Helvetica"/>
+            <a:latin typeface="+mn-lt"/>
+            <a:ea typeface="+mn-ea"/>
+            <a:cs typeface="+mn-cs"/>
+            <a:sym typeface="Helvetica Neue"/>
           </a:defRPr>
         </a:defPPr>
         <a:lvl1pPr marL="0" marR="0" indent="0" algn="l" defTabSz="914400" rtl="0" fontAlgn="auto" latinLnBrk="1" hangingPunct="0">
@@ -5804,10 +6280,10 @@
             </a:solidFill>
             <a:effectLst/>
             <a:uFillTx/>
-            <a:latin typeface="+mj-lt"/>
-            <a:ea typeface="+mj-ea"/>
-            <a:cs typeface="+mj-cs"/>
-            <a:sym typeface="Helvetica"/>
+            <a:latin typeface="+mn-lt"/>
+            <a:ea typeface="+mn-ea"/>
+            <a:cs typeface="+mn-cs"/>
+            <a:sym typeface="Helvetica Neue"/>
           </a:defRPr>
         </a:defPPr>
         <a:lvl1pPr marL="0" marR="0" indent="0" algn="l" defTabSz="914400" rtl="0" fontAlgn="auto" latinLnBrk="1" hangingPunct="0">

</xml_diff>